<commit_message>
oprava chybky v paginátoru
</commit_message>
<xml_diff>
--- a/05-latte-formulare/todolist2-reseni-3-filtrovani-strankovani.pptx
+++ b/05-latte-formulare/todolist2-reseni-3-filtrovani-strankovani.pptx
@@ -288,7 +288,7 @@
           <a:p>
             <a:fld id="{EAD9B8A3-3919-4DB4-BA95-9BB99F31FCD8}" type="datetimeFigureOut">
               <a:rPr lang="cs-CZ" smtClean="0"/>
-              <a:t>30.10.2021</a:t>
+              <a:t>06.11.2021</a:t>
             </a:fld>
             <a:endParaRPr lang="cs-CZ"/>
           </a:p>
@@ -486,7 +486,7 @@
           <a:p>
             <a:fld id="{EAD9B8A3-3919-4DB4-BA95-9BB99F31FCD8}" type="datetimeFigureOut">
               <a:rPr lang="cs-CZ" smtClean="0"/>
-              <a:t>30.10.2021</a:t>
+              <a:t>06.11.2021</a:t>
             </a:fld>
             <a:endParaRPr lang="cs-CZ"/>
           </a:p>
@@ -694,7 +694,7 @@
           <a:p>
             <a:fld id="{EAD9B8A3-3919-4DB4-BA95-9BB99F31FCD8}" type="datetimeFigureOut">
               <a:rPr lang="cs-CZ" smtClean="0"/>
-              <a:t>30.10.2021</a:t>
+              <a:t>06.11.2021</a:t>
             </a:fld>
             <a:endParaRPr lang="cs-CZ"/>
           </a:p>
@@ -892,7 +892,7 @@
           <a:p>
             <a:fld id="{EAD9B8A3-3919-4DB4-BA95-9BB99F31FCD8}" type="datetimeFigureOut">
               <a:rPr lang="cs-CZ" smtClean="0"/>
-              <a:t>30.10.2021</a:t>
+              <a:t>06.11.2021</a:t>
             </a:fld>
             <a:endParaRPr lang="cs-CZ"/>
           </a:p>
@@ -1167,7 +1167,7 @@
           <a:p>
             <a:fld id="{EAD9B8A3-3919-4DB4-BA95-9BB99F31FCD8}" type="datetimeFigureOut">
               <a:rPr lang="cs-CZ" smtClean="0"/>
-              <a:t>30.10.2021</a:t>
+              <a:t>06.11.2021</a:t>
             </a:fld>
             <a:endParaRPr lang="cs-CZ"/>
           </a:p>
@@ -1432,7 +1432,7 @@
           <a:p>
             <a:fld id="{EAD9B8A3-3919-4DB4-BA95-9BB99F31FCD8}" type="datetimeFigureOut">
               <a:rPr lang="cs-CZ" smtClean="0"/>
-              <a:t>30.10.2021</a:t>
+              <a:t>06.11.2021</a:t>
             </a:fld>
             <a:endParaRPr lang="cs-CZ"/>
           </a:p>
@@ -1844,7 +1844,7 @@
           <a:p>
             <a:fld id="{EAD9B8A3-3919-4DB4-BA95-9BB99F31FCD8}" type="datetimeFigureOut">
               <a:rPr lang="cs-CZ" smtClean="0"/>
-              <a:t>30.10.2021</a:t>
+              <a:t>06.11.2021</a:t>
             </a:fld>
             <a:endParaRPr lang="cs-CZ"/>
           </a:p>
@@ -1985,7 +1985,7 @@
           <a:p>
             <a:fld id="{EAD9B8A3-3919-4DB4-BA95-9BB99F31FCD8}" type="datetimeFigureOut">
               <a:rPr lang="cs-CZ" smtClean="0"/>
-              <a:t>30.10.2021</a:t>
+              <a:t>06.11.2021</a:t>
             </a:fld>
             <a:endParaRPr lang="cs-CZ"/>
           </a:p>
@@ -2098,7 +2098,7 @@
           <a:p>
             <a:fld id="{EAD9B8A3-3919-4DB4-BA95-9BB99F31FCD8}" type="datetimeFigureOut">
               <a:rPr lang="cs-CZ" smtClean="0"/>
-              <a:t>30.10.2021</a:t>
+              <a:t>06.11.2021</a:t>
             </a:fld>
             <a:endParaRPr lang="cs-CZ"/>
           </a:p>
@@ -2409,7 +2409,7 @@
           <a:p>
             <a:fld id="{EAD9B8A3-3919-4DB4-BA95-9BB99F31FCD8}" type="datetimeFigureOut">
               <a:rPr lang="cs-CZ" smtClean="0"/>
-              <a:t>30.10.2021</a:t>
+              <a:t>06.11.2021</a:t>
             </a:fld>
             <a:endParaRPr lang="cs-CZ"/>
           </a:p>
@@ -2697,7 +2697,7 @@
           <a:p>
             <a:fld id="{EAD9B8A3-3919-4DB4-BA95-9BB99F31FCD8}" type="datetimeFigureOut">
               <a:rPr lang="cs-CZ" smtClean="0"/>
-              <a:t>30.10.2021</a:t>
+              <a:t>06.11.2021</a:t>
             </a:fld>
             <a:endParaRPr lang="cs-CZ"/>
           </a:p>
@@ -2938,7 +2938,7 @@
           <a:p>
             <a:fld id="{EAD9B8A3-3919-4DB4-BA95-9BB99F31FCD8}" type="datetimeFigureOut">
               <a:rPr lang="cs-CZ" smtClean="0"/>
-              <a:t>30.10.2021</a:t>
+              <a:t>06.11.2021</a:t>
             </a:fld>
             <a:endParaRPr lang="cs-CZ"/>
           </a:p>
@@ -7513,10 +7513,10 @@
       </p:sp>
       <p:pic>
         <p:nvPicPr>
-          <p:cNvPr id="7" name="Obrázek 6">
-            <a:extLst>
-              <a:ext uri="{FF2B5EF4-FFF2-40B4-BE49-F238E27FC236}">
-                <a16:creationId xmlns:a16="http://schemas.microsoft.com/office/drawing/2014/main" id="{F32F31CA-EB4C-40EC-8CBB-3DA49998C18F}"/>
+          <p:cNvPr id="10" name="Obrázek 9">
+            <a:extLst>
+              <a:ext uri="{FF2B5EF4-FFF2-40B4-BE49-F238E27FC236}">
+                <a16:creationId xmlns:a16="http://schemas.microsoft.com/office/drawing/2014/main" id="{F5C381BC-CF5F-48CC-85ED-A1041A2561D6}"/>
               </a:ext>
             </a:extLst>
           </p:cNvPr>
@@ -7555,8 +7555,8 @@
         </p:nvSpPr>
         <p:spPr>
           <a:xfrm>
-            <a:off x="936677" y="4745591"/>
-            <a:ext cx="4001083" cy="1008095"/>
+            <a:off x="936677" y="4375051"/>
+            <a:ext cx="6406658" cy="1336431"/>
           </a:xfrm>
           <a:prstGeom prst="rect">
             <a:avLst/>
@@ -7607,8 +7607,8 @@
         </p:nvSpPr>
         <p:spPr>
           <a:xfrm>
-            <a:off x="6829280" y="1145032"/>
-            <a:ext cx="3854547" cy="3139321"/>
+            <a:off x="8039102" y="817091"/>
+            <a:ext cx="3854547" cy="3693319"/>
           </a:xfrm>
           <a:prstGeom prst="rect">
             <a:avLst/>
@@ -7654,6 +7654,33 @@
             <a:r>
               <a:rPr lang="cs-CZ" dirty="0"/>
               <a:t>. Když máme v požadavku zadanou nesmyslnou/neexistující stránku, uživatele přesměrujeme.</a:t>
+            </a:r>
+            <a:endParaRPr lang="en-US" dirty="0"/>
+          </a:p>
+          <a:p>
+            <a:r>
+              <a:rPr lang="en-US" dirty="0" err="1"/>
+              <a:t>Pokud</a:t>
+            </a:r>
+            <a:r>
+              <a:rPr lang="en-US" dirty="0"/>
+              <a:t> b</a:t>
+            </a:r>
+            <a:r>
+              <a:rPr lang="cs-CZ" dirty="0" err="1"/>
+              <a:t>yla</a:t>
+            </a:r>
+            <a:r>
+              <a:rPr lang="cs-CZ" dirty="0"/>
+              <a:t> hodnota v pořádku, zadáme aktivní stránku do </a:t>
+            </a:r>
+            <a:r>
+              <a:rPr lang="cs-CZ" dirty="0" err="1"/>
+              <a:t>paginátoru</a:t>
+            </a:r>
+            <a:r>
+              <a:rPr lang="cs-CZ" dirty="0"/>
+              <a:t>.</a:t>
             </a:r>
           </a:p>
         </p:txBody>
@@ -7740,10 +7767,10 @@
       </p:sp>
       <p:pic>
         <p:nvPicPr>
-          <p:cNvPr id="7" name="Obrázek 6">
-            <a:extLst>
-              <a:ext uri="{FF2B5EF4-FFF2-40B4-BE49-F238E27FC236}">
-                <a16:creationId xmlns:a16="http://schemas.microsoft.com/office/drawing/2014/main" id="{1FBA3C38-774F-4A4F-86EF-029B00986BE6}"/>
+          <p:cNvPr id="5" name="Obrázek 4">
+            <a:extLst>
+              <a:ext uri="{FF2B5EF4-FFF2-40B4-BE49-F238E27FC236}">
+                <a16:creationId xmlns:a16="http://schemas.microsoft.com/office/drawing/2014/main" id="{DD0C2E3D-7F12-4E2C-9BCB-C5E814D3642D}"/>
               </a:ext>
             </a:extLst>
           </p:cNvPr>
@@ -7782,8 +7809,8 @@
         </p:nvSpPr>
         <p:spPr>
           <a:xfrm>
-            <a:off x="964812" y="4933474"/>
-            <a:ext cx="7391397" cy="403185"/>
+            <a:off x="964812" y="4891270"/>
+            <a:ext cx="7602413" cy="403185"/>
           </a:xfrm>
           <a:prstGeom prst="rect">
             <a:avLst/>
@@ -7834,7 +7861,7 @@
         </p:nvSpPr>
         <p:spPr>
           <a:xfrm>
-            <a:off x="7751299" y="3665676"/>
+            <a:off x="7751299" y="3539064"/>
             <a:ext cx="3854547" cy="1200329"/>
           </a:xfrm>
           <a:prstGeom prst="rect">

</xml_diff>